<commit_message>
novos botões DIREITA e ESQUERDA
</commit_message>
<xml_diff>
--- a/img/controlador_IPM.pptx
+++ b/img/controlador_IPM.pptx
@@ -261,7 +261,7 @@
           <a:p>
             <a:fld id="{9428D7DF-2E67-4A0D-A73D-C8703B0B10E1}" type="datetimeFigureOut">
               <a:rPr lang="pt-PT" smtClean="0"/>
-              <a:t>09/05/2019</a:t>
+              <a:t>14/05/2019</a:t>
             </a:fld>
             <a:endParaRPr lang="pt-PT"/>
           </a:p>
@@ -461,7 +461,7 @@
           <a:p>
             <a:fld id="{9428D7DF-2E67-4A0D-A73D-C8703B0B10E1}" type="datetimeFigureOut">
               <a:rPr lang="pt-PT" smtClean="0"/>
-              <a:t>09/05/2019</a:t>
+              <a:t>14/05/2019</a:t>
             </a:fld>
             <a:endParaRPr lang="pt-PT"/>
           </a:p>
@@ -671,7 +671,7 @@
           <a:p>
             <a:fld id="{9428D7DF-2E67-4A0D-A73D-C8703B0B10E1}" type="datetimeFigureOut">
               <a:rPr lang="pt-PT" smtClean="0"/>
-              <a:t>09/05/2019</a:t>
+              <a:t>14/05/2019</a:t>
             </a:fld>
             <a:endParaRPr lang="pt-PT"/>
           </a:p>
@@ -871,7 +871,7 @@
           <a:p>
             <a:fld id="{9428D7DF-2E67-4A0D-A73D-C8703B0B10E1}" type="datetimeFigureOut">
               <a:rPr lang="pt-PT" smtClean="0"/>
-              <a:t>09/05/2019</a:t>
+              <a:t>14/05/2019</a:t>
             </a:fld>
             <a:endParaRPr lang="pt-PT"/>
           </a:p>
@@ -1147,7 +1147,7 @@
           <a:p>
             <a:fld id="{9428D7DF-2E67-4A0D-A73D-C8703B0B10E1}" type="datetimeFigureOut">
               <a:rPr lang="pt-PT" smtClean="0"/>
-              <a:t>09/05/2019</a:t>
+              <a:t>14/05/2019</a:t>
             </a:fld>
             <a:endParaRPr lang="pt-PT"/>
           </a:p>
@@ -1415,7 +1415,7 @@
           <a:p>
             <a:fld id="{9428D7DF-2E67-4A0D-A73D-C8703B0B10E1}" type="datetimeFigureOut">
               <a:rPr lang="pt-PT" smtClean="0"/>
-              <a:t>09/05/2019</a:t>
+              <a:t>14/05/2019</a:t>
             </a:fld>
             <a:endParaRPr lang="pt-PT"/>
           </a:p>
@@ -1830,7 +1830,7 @@
           <a:p>
             <a:fld id="{9428D7DF-2E67-4A0D-A73D-C8703B0B10E1}" type="datetimeFigureOut">
               <a:rPr lang="pt-PT" smtClean="0"/>
-              <a:t>09/05/2019</a:t>
+              <a:t>14/05/2019</a:t>
             </a:fld>
             <a:endParaRPr lang="pt-PT"/>
           </a:p>
@@ -1972,7 +1972,7 @@
           <a:p>
             <a:fld id="{9428D7DF-2E67-4A0D-A73D-C8703B0B10E1}" type="datetimeFigureOut">
               <a:rPr lang="pt-PT" smtClean="0"/>
-              <a:t>09/05/2019</a:t>
+              <a:t>14/05/2019</a:t>
             </a:fld>
             <a:endParaRPr lang="pt-PT"/>
           </a:p>
@@ -2085,7 +2085,7 @@
           <a:p>
             <a:fld id="{9428D7DF-2E67-4A0D-A73D-C8703B0B10E1}" type="datetimeFigureOut">
               <a:rPr lang="pt-PT" smtClean="0"/>
-              <a:t>09/05/2019</a:t>
+              <a:t>14/05/2019</a:t>
             </a:fld>
             <a:endParaRPr lang="pt-PT"/>
           </a:p>
@@ -2398,7 +2398,7 @@
           <a:p>
             <a:fld id="{9428D7DF-2E67-4A0D-A73D-C8703B0B10E1}" type="datetimeFigureOut">
               <a:rPr lang="pt-PT" smtClean="0"/>
-              <a:t>09/05/2019</a:t>
+              <a:t>14/05/2019</a:t>
             </a:fld>
             <a:endParaRPr lang="pt-PT"/>
           </a:p>
@@ -2687,7 +2687,7 @@
           <a:p>
             <a:fld id="{9428D7DF-2E67-4A0D-A73D-C8703B0B10E1}" type="datetimeFigureOut">
               <a:rPr lang="pt-PT" smtClean="0"/>
-              <a:t>09/05/2019</a:t>
+              <a:t>14/05/2019</a:t>
             </a:fld>
             <a:endParaRPr lang="pt-PT"/>
           </a:p>
@@ -2930,7 +2930,7 @@
           <a:p>
             <a:fld id="{9428D7DF-2E67-4A0D-A73D-C8703B0B10E1}" type="datetimeFigureOut">
               <a:rPr lang="pt-PT" smtClean="0"/>
-              <a:t>09/05/2019</a:t>
+              <a:t>14/05/2019</a:t>
             </a:fld>
             <a:endParaRPr lang="pt-PT"/>
           </a:p>
@@ -3533,8 +3533,8 @@
         </p:nvSpPr>
         <p:spPr>
           <a:xfrm>
-            <a:off x="8313629" y="3310989"/>
-            <a:ext cx="353422" cy="1129481"/>
+            <a:off x="8468900" y="3610037"/>
+            <a:ext cx="353422" cy="890815"/>
           </a:xfrm>
           <a:prstGeom prst="roundRect">
             <a:avLst/>
@@ -3608,7 +3608,7 @@
         </p:nvSpPr>
         <p:spPr>
           <a:xfrm>
-            <a:off x="9163771" y="3123212"/>
+            <a:off x="9338625" y="3123213"/>
             <a:ext cx="660225" cy="375552"/>
           </a:xfrm>
           <a:prstGeom prst="rect">
@@ -3665,7 +3665,7 @@
         </p:nvSpPr>
         <p:spPr>
           <a:xfrm>
-            <a:off x="8961805" y="4178157"/>
+            <a:off x="9074849" y="4184367"/>
             <a:ext cx="1269305" cy="375552"/>
           </a:xfrm>
           <a:prstGeom prst="rect">
@@ -3775,7 +3775,7 @@
         </p:nvSpPr>
         <p:spPr>
           <a:xfrm rot="16200000">
-            <a:off x="8088128" y="3639428"/>
+            <a:off x="8243399" y="3837826"/>
             <a:ext cx="796625" cy="375552"/>
           </a:xfrm>
           <a:prstGeom prst="rect">
@@ -3823,66 +3823,6 @@
       </p:sp>
       <p:sp>
         <p:nvSpPr>
-          <p:cNvPr id="16" name="TextBox 35">
-            <a:extLst>
-              <a:ext uri="{FF2B5EF4-FFF2-40B4-BE49-F238E27FC236}">
-                <a16:creationId xmlns:a16="http://schemas.microsoft.com/office/drawing/2014/main" id="{D9EC5166-0D83-41DE-8F41-7F214DF6D922}"/>
-              </a:ext>
-            </a:extLst>
-          </p:cNvPr>
-          <p:cNvSpPr txBox="1"/>
-          <p:nvPr/>
-        </p:nvSpPr>
-        <p:spPr>
-          <a:xfrm>
-            <a:off x="9243392" y="3677827"/>
-            <a:ext cx="1564081" cy="312650"/>
-          </a:xfrm>
-          <a:prstGeom prst="rect">
-            <a:avLst/>
-          </a:prstGeom>
-          <a:noFill/>
-        </p:spPr>
-        <p:txBody>
-          <a:bodyPr wrap="square" rtlCol="0">
-            <a:spAutoFit/>
-          </a:bodyPr>
-          <a:lstStyle/>
-          <a:p>
-            <a:pPr>
-              <a:lnSpc>
-                <a:spcPct val="107000"/>
-              </a:lnSpc>
-              <a:spcAft>
-                <a:spcPts val="800"/>
-              </a:spcAft>
-            </a:pPr>
-            <a:r>
-              <a:rPr lang="en-US" sz="1400" kern="1200" dirty="0">
-                <a:solidFill>
-                  <a:schemeClr val="bg1"/>
-                </a:solidFill>
-                <a:effectLst/>
-                <a:latin typeface="Calibri" panose="020F0502020204030204" pitchFamily="34" charset="0"/>
-                <a:ea typeface="Calibri" panose="020F0502020204030204" pitchFamily="34" charset="0"/>
-                <a:cs typeface="Times New Roman" panose="02020603050405020304" pitchFamily="18" charset="0"/>
-              </a:rPr>
-              <a:t>ON/OFF</a:t>
-            </a:r>
-            <a:endParaRPr lang="pt-PT" sz="1400" dirty="0">
-              <a:solidFill>
-                <a:schemeClr val="bg1"/>
-              </a:solidFill>
-              <a:effectLst/>
-              <a:latin typeface="Calibri" panose="020F0502020204030204" pitchFamily="34" charset="0"/>
-              <a:ea typeface="Calibri" panose="020F0502020204030204" pitchFamily="34" charset="0"/>
-              <a:cs typeface="Times New Roman" panose="02020603050405020304" pitchFamily="18" charset="0"/>
-            </a:endParaRPr>
-          </a:p>
-        </p:txBody>
-      </p:sp>
-      <p:sp>
-        <p:nvSpPr>
           <p:cNvPr id="23" name="TextBox 30">
             <a:extLst>
               <a:ext uri="{FF2B5EF4-FFF2-40B4-BE49-F238E27FC236}">
@@ -3955,8 +3895,8 @@
         </p:nvSpPr>
         <p:spPr>
           <a:xfrm>
-            <a:off x="8313628" y="2743200"/>
-            <a:ext cx="1126643" cy="219015"/>
+            <a:off x="8261873" y="2743200"/>
+            <a:ext cx="554326" cy="219015"/>
           </a:xfrm>
           <a:prstGeom prst="roundRect">
             <a:avLst/>
@@ -3992,69 +3932,20 @@
       </p:sp>
       <p:sp>
         <p:nvSpPr>
-          <p:cNvPr id="17" name="Rectangle: Rounded Corners 16">
-            <a:extLst>
-              <a:ext uri="{FF2B5EF4-FFF2-40B4-BE49-F238E27FC236}">
-                <a16:creationId xmlns:a16="http://schemas.microsoft.com/office/drawing/2014/main" id="{C7BDBD9A-CB8D-48E9-8393-E18BDD18B838}"/>
-              </a:ext>
-            </a:extLst>
-          </p:cNvPr>
-          <p:cNvSpPr/>
+          <p:cNvPr id="19" name="TextBox 35">
+            <a:extLst>
+              <a:ext uri="{FF2B5EF4-FFF2-40B4-BE49-F238E27FC236}">
+                <a16:creationId xmlns:a16="http://schemas.microsoft.com/office/drawing/2014/main" id="{33DFE594-820E-440B-9E4E-D454321A4189}"/>
+              </a:ext>
+            </a:extLst>
+          </p:cNvPr>
+          <p:cNvSpPr txBox="1"/>
           <p:nvPr/>
         </p:nvSpPr>
         <p:spPr>
           <a:xfrm>
-            <a:off x="8320656" y="4777247"/>
-            <a:ext cx="1126643" cy="219015"/>
-          </a:xfrm>
-          <a:prstGeom prst="roundRect">
-            <a:avLst/>
-          </a:prstGeom>
-          <a:solidFill>
-            <a:schemeClr val="tx2"/>
-          </a:solidFill>
-        </p:spPr>
-        <p:style>
-          <a:lnRef idx="2">
-            <a:schemeClr val="accent1">
-              <a:shade val="50000"/>
-            </a:schemeClr>
-          </a:lnRef>
-          <a:fillRef idx="1">
-            <a:schemeClr val="accent1"/>
-          </a:fillRef>
-          <a:effectRef idx="0">
-            <a:schemeClr val="accent1"/>
-          </a:effectRef>
-          <a:fontRef idx="minor">
-            <a:schemeClr val="lt1"/>
-          </a:fontRef>
-        </p:style>
-        <p:txBody>
-          <a:bodyPr rtlCol="0" anchor="ctr"/>
-          <a:lstStyle/>
-          <a:p>
-            <a:pPr algn="ctr"/>
-            <a:endParaRPr lang="pt-PT"/>
-          </a:p>
-        </p:txBody>
-      </p:sp>
-      <p:sp>
-        <p:nvSpPr>
-          <p:cNvPr id="19" name="TextBox 35">
-            <a:extLst>
-              <a:ext uri="{FF2B5EF4-FFF2-40B4-BE49-F238E27FC236}">
-                <a16:creationId xmlns:a16="http://schemas.microsoft.com/office/drawing/2014/main" id="{33DFE594-820E-440B-9E4E-D454321A4189}"/>
-              </a:ext>
-            </a:extLst>
-          </p:cNvPr>
-          <p:cNvSpPr txBox="1"/>
-          <p:nvPr/>
-        </p:nvSpPr>
-        <p:spPr>
-          <a:xfrm>
-            <a:off x="8366347" y="2687160"/>
-            <a:ext cx="1564081" cy="312650"/>
+            <a:off x="8205356" y="2712091"/>
+            <a:ext cx="1204433" cy="281231"/>
           </a:xfrm>
           <a:prstGeom prst="rect">
             <a:avLst/>
@@ -4076,7 +3967,7 @@
               </a:spcAft>
             </a:pPr>
             <a:r>
-              <a:rPr lang="en-US" sz="1400" kern="1200" dirty="0">
+              <a:rPr lang="en-US" sz="1200" kern="1200" dirty="0">
                 <a:solidFill>
                   <a:schemeClr val="bg1"/>
                 </a:solidFill>
@@ -4085,9 +3976,9 @@
                 <a:ea typeface="Calibri" panose="020F0502020204030204" pitchFamily="34" charset="0"/>
                 <a:cs typeface="Times New Roman" panose="02020603050405020304" pitchFamily="18" charset="0"/>
               </a:rPr>
-              <a:t>CONFIRMAR</a:t>
-            </a:r>
-            <a:endParaRPr lang="pt-PT" sz="1400" dirty="0">
+              <a:t>ON/OFF</a:t>
+            </a:r>
+            <a:endParaRPr lang="pt-PT" sz="1200" dirty="0">
               <a:solidFill>
                 <a:schemeClr val="bg1"/>
               </a:solidFill>
@@ -4099,66 +3990,151 @@
           </a:p>
         </p:txBody>
       </p:sp>
-      <p:sp>
-        <p:nvSpPr>
-          <p:cNvPr id="20" name="TextBox 35">
-            <a:extLst>
-              <a:ext uri="{FF2B5EF4-FFF2-40B4-BE49-F238E27FC236}">
-                <a16:creationId xmlns:a16="http://schemas.microsoft.com/office/drawing/2014/main" id="{B6AF3CA0-CF68-4E6F-A431-75FDA0648F6B}"/>
-              </a:ext>
-            </a:extLst>
-          </p:cNvPr>
-          <p:cNvSpPr txBox="1"/>
+      <p:pic>
+        <p:nvPicPr>
+          <p:cNvPr id="3" name="Picture 2">
+            <a:extLst>
+              <a:ext uri="{FF2B5EF4-FFF2-40B4-BE49-F238E27FC236}">
+                <a16:creationId xmlns:a16="http://schemas.microsoft.com/office/drawing/2014/main" id="{F63CE08D-8D45-43AE-A7F2-84123DE0E3A0}"/>
+              </a:ext>
+            </a:extLst>
+          </p:cNvPr>
+          <p:cNvPicPr>
+            <a:picLocks noChangeAspect="1"/>
+          </p:cNvPicPr>
           <p:nvPr/>
-        </p:nvSpPr>
+        </p:nvPicPr>
+        <p:blipFill>
+          <a:blip r:embed="rId2"/>
+          <a:stretch>
+            <a:fillRect/>
+          </a:stretch>
+        </p:blipFill>
         <p:spPr>
           <a:xfrm>
-            <a:off x="8418669" y="4730429"/>
-            <a:ext cx="1564081" cy="312650"/>
+            <a:off x="9455735" y="3695909"/>
+            <a:ext cx="333375" cy="285750"/>
           </a:xfrm>
           <a:prstGeom prst="rect">
             <a:avLst/>
           </a:prstGeom>
-          <a:noFill/>
         </p:spPr>
-        <p:txBody>
-          <a:bodyPr wrap="square" rtlCol="0">
-            <a:spAutoFit/>
-          </a:bodyPr>
-          <a:lstStyle/>
-          <a:p>
-            <a:pPr>
-              <a:lnSpc>
-                <a:spcPct val="107000"/>
-              </a:lnSpc>
-              <a:spcAft>
-                <a:spcPts val="800"/>
-              </a:spcAft>
-            </a:pPr>
-            <a:r>
-              <a:rPr lang="en-US" sz="1400" kern="1200" dirty="0">
-                <a:solidFill>
-                  <a:schemeClr val="bg1"/>
-                </a:solidFill>
-                <a:effectLst/>
-                <a:latin typeface="Calibri" panose="020F0502020204030204" pitchFamily="34" charset="0"/>
-                <a:ea typeface="Calibri" panose="020F0502020204030204" pitchFamily="34" charset="0"/>
-                <a:cs typeface="Times New Roman" panose="02020603050405020304" pitchFamily="18" charset="0"/>
-              </a:rPr>
-              <a:t>CANCELAR</a:t>
-            </a:r>
-            <a:endParaRPr lang="pt-PT" sz="1400" dirty="0">
-              <a:solidFill>
-                <a:schemeClr val="bg1"/>
-              </a:solidFill>
-              <a:effectLst/>
-              <a:latin typeface="Calibri" panose="020F0502020204030204" pitchFamily="34" charset="0"/>
-              <a:ea typeface="Calibri" panose="020F0502020204030204" pitchFamily="34" charset="0"/>
-              <a:cs typeface="Times New Roman" panose="02020603050405020304" pitchFamily="18" charset="0"/>
-            </a:endParaRPr>
-          </a:p>
-        </p:txBody>
-      </p:sp>
+      </p:pic>
+      <p:grpSp>
+        <p:nvGrpSpPr>
+          <p:cNvPr id="11" name="Group 10">
+            <a:extLst>
+              <a:ext uri="{FF2B5EF4-FFF2-40B4-BE49-F238E27FC236}">
+                <a16:creationId xmlns:a16="http://schemas.microsoft.com/office/drawing/2014/main" id="{5F105F91-6E60-4EBF-9BC1-8698B1A3209E}"/>
+              </a:ext>
+            </a:extLst>
+          </p:cNvPr>
+          <p:cNvGrpSpPr/>
+          <p:nvPr/>
+        </p:nvGrpSpPr>
+        <p:grpSpPr>
+          <a:xfrm>
+            <a:off x="8284388" y="3259965"/>
+            <a:ext cx="717268" cy="279381"/>
+            <a:chOff x="8267136" y="3259965"/>
+            <a:chExt cx="717268" cy="279381"/>
+          </a:xfrm>
+        </p:grpSpPr>
+        <p:sp>
+          <p:nvSpPr>
+            <p:cNvPr id="4" name="Isosceles Triangle 3">
+              <a:extLst>
+                <a:ext uri="{FF2B5EF4-FFF2-40B4-BE49-F238E27FC236}">
+                  <a16:creationId xmlns:a16="http://schemas.microsoft.com/office/drawing/2014/main" id="{A03EF04B-1E96-432C-989A-F99090397CCF}"/>
+                </a:ext>
+              </a:extLst>
+            </p:cNvPr>
+            <p:cNvSpPr/>
+            <p:nvPr/>
+          </p:nvSpPr>
+          <p:spPr>
+            <a:xfrm rot="16200000">
+              <a:off x="8286178" y="3244781"/>
+              <a:ext cx="275523" cy="313608"/>
+            </a:xfrm>
+            <a:prstGeom prst="triangle">
+              <a:avLst/>
+            </a:prstGeom>
+            <a:solidFill>
+              <a:schemeClr val="tx2"/>
+            </a:solidFill>
+          </p:spPr>
+          <p:style>
+            <a:lnRef idx="0">
+              <a:schemeClr val="dk1"/>
+            </a:lnRef>
+            <a:fillRef idx="3">
+              <a:schemeClr val="dk1"/>
+            </a:fillRef>
+            <a:effectRef idx="3">
+              <a:schemeClr val="dk1"/>
+            </a:effectRef>
+            <a:fontRef idx="minor">
+              <a:schemeClr val="lt1"/>
+            </a:fontRef>
+          </p:style>
+          <p:txBody>
+            <a:bodyPr rtlCol="0" anchor="ctr"/>
+            <a:lstStyle/>
+            <a:p>
+              <a:pPr algn="ctr"/>
+              <a:endParaRPr lang="pt-PT"/>
+            </a:p>
+          </p:txBody>
+        </p:sp>
+        <p:sp>
+          <p:nvSpPr>
+            <p:cNvPr id="21" name="Isosceles Triangle 20">
+              <a:extLst>
+                <a:ext uri="{FF2B5EF4-FFF2-40B4-BE49-F238E27FC236}">
+                  <a16:creationId xmlns:a16="http://schemas.microsoft.com/office/drawing/2014/main" id="{2073E3CF-F203-4B15-AB35-8E7713726B1D}"/>
+                </a:ext>
+              </a:extLst>
+            </p:cNvPr>
+            <p:cNvSpPr/>
+            <p:nvPr/>
+          </p:nvSpPr>
+          <p:spPr>
+            <a:xfrm rot="5400000">
+              <a:off x="8689838" y="3240923"/>
+              <a:ext cx="275523" cy="313608"/>
+            </a:xfrm>
+            <a:prstGeom prst="triangle">
+              <a:avLst/>
+            </a:prstGeom>
+            <a:solidFill>
+              <a:schemeClr val="tx2"/>
+            </a:solidFill>
+          </p:spPr>
+          <p:style>
+            <a:lnRef idx="0">
+              <a:schemeClr val="dk1"/>
+            </a:lnRef>
+            <a:fillRef idx="3">
+              <a:schemeClr val="dk1"/>
+            </a:fillRef>
+            <a:effectRef idx="3">
+              <a:schemeClr val="dk1"/>
+            </a:effectRef>
+            <a:fontRef idx="minor">
+              <a:schemeClr val="lt1"/>
+            </a:fontRef>
+          </p:style>
+          <p:txBody>
+            <a:bodyPr rtlCol="0" anchor="ctr"/>
+            <a:lstStyle/>
+            <a:p>
+              <a:pPr algn="ctr"/>
+              <a:endParaRPr lang="pt-PT"/>
+            </a:p>
+          </p:txBody>
+        </p:sp>
+      </p:grpSp>
     </p:spTree>
     <p:extLst>
       <p:ext uri="{BB962C8B-B14F-4D97-AF65-F5344CB8AC3E}">

</xml_diff>